<commit_message>
added sound for beginning
</commit_message>
<xml_diff>
--- a/Praesi/Digitales Theremin.pptx
+++ b/Praesi/Digitales Theremin.pptx
@@ -220,7 +220,7 @@
           <a:p>
             <a:fld id="{4F6A71F5-E6D9-4084-8738-38AAC0210A80}" type="datetimeFigureOut">
               <a:rPr lang="de-CH" smtClean="0"/>
-              <a:t>05.09.2020</a:t>
+              <a:t>09.09.2020</a:t>
             </a:fld>
             <a:endParaRPr lang="de-CH"/>
           </a:p>
@@ -1293,7 +1293,7 @@
           <a:p>
             <a:fld id="{CBF0EB22-9355-4E16-8B44-2211E8112CFE}" type="datetimeFigureOut">
               <a:rPr lang="de-CH" smtClean="0"/>
-              <a:t>05.09.2020</a:t>
+              <a:t>09.09.2020</a:t>
             </a:fld>
             <a:endParaRPr lang="de-CH"/>
           </a:p>
@@ -1493,7 +1493,7 @@
           <a:p>
             <a:fld id="{CBF0EB22-9355-4E16-8B44-2211E8112CFE}" type="datetimeFigureOut">
               <a:rPr lang="de-CH" smtClean="0"/>
-              <a:t>05.09.2020</a:t>
+              <a:t>09.09.2020</a:t>
             </a:fld>
             <a:endParaRPr lang="de-CH"/>
           </a:p>
@@ -1703,7 +1703,7 @@
           <a:p>
             <a:fld id="{CBF0EB22-9355-4E16-8B44-2211E8112CFE}" type="datetimeFigureOut">
               <a:rPr lang="de-CH" smtClean="0"/>
-              <a:t>05.09.2020</a:t>
+              <a:t>09.09.2020</a:t>
             </a:fld>
             <a:endParaRPr lang="de-CH"/>
           </a:p>
@@ -1903,7 +1903,7 @@
           <a:p>
             <a:fld id="{CBF0EB22-9355-4E16-8B44-2211E8112CFE}" type="datetimeFigureOut">
               <a:rPr lang="de-CH" smtClean="0"/>
-              <a:t>05.09.2020</a:t>
+              <a:t>09.09.2020</a:t>
             </a:fld>
             <a:endParaRPr lang="de-CH"/>
           </a:p>
@@ -2179,7 +2179,7 @@
           <a:p>
             <a:fld id="{CBF0EB22-9355-4E16-8B44-2211E8112CFE}" type="datetimeFigureOut">
               <a:rPr lang="de-CH" smtClean="0"/>
-              <a:t>05.09.2020</a:t>
+              <a:t>09.09.2020</a:t>
             </a:fld>
             <a:endParaRPr lang="de-CH"/>
           </a:p>
@@ -2447,7 +2447,7 @@
           <a:p>
             <a:fld id="{CBF0EB22-9355-4E16-8B44-2211E8112CFE}" type="datetimeFigureOut">
               <a:rPr lang="de-CH" smtClean="0"/>
-              <a:t>05.09.2020</a:t>
+              <a:t>09.09.2020</a:t>
             </a:fld>
             <a:endParaRPr lang="de-CH"/>
           </a:p>
@@ -2862,7 +2862,7 @@
           <a:p>
             <a:fld id="{CBF0EB22-9355-4E16-8B44-2211E8112CFE}" type="datetimeFigureOut">
               <a:rPr lang="de-CH" smtClean="0"/>
-              <a:t>05.09.2020</a:t>
+              <a:t>09.09.2020</a:t>
             </a:fld>
             <a:endParaRPr lang="de-CH"/>
           </a:p>
@@ -3004,7 +3004,7 @@
           <a:p>
             <a:fld id="{CBF0EB22-9355-4E16-8B44-2211E8112CFE}" type="datetimeFigureOut">
               <a:rPr lang="de-CH" smtClean="0"/>
-              <a:t>05.09.2020</a:t>
+              <a:t>09.09.2020</a:t>
             </a:fld>
             <a:endParaRPr lang="de-CH"/>
           </a:p>
@@ -3117,7 +3117,7 @@
           <a:p>
             <a:fld id="{CBF0EB22-9355-4E16-8B44-2211E8112CFE}" type="datetimeFigureOut">
               <a:rPr lang="de-CH" smtClean="0"/>
-              <a:t>05.09.2020</a:t>
+              <a:t>09.09.2020</a:t>
             </a:fld>
             <a:endParaRPr lang="de-CH"/>
           </a:p>
@@ -3430,7 +3430,7 @@
           <a:p>
             <a:fld id="{CBF0EB22-9355-4E16-8B44-2211E8112CFE}" type="datetimeFigureOut">
               <a:rPr lang="de-CH" smtClean="0"/>
-              <a:t>05.09.2020</a:t>
+              <a:t>09.09.2020</a:t>
             </a:fld>
             <a:endParaRPr lang="de-CH"/>
           </a:p>
@@ -3719,7 +3719,7 @@
           <a:p>
             <a:fld id="{CBF0EB22-9355-4E16-8B44-2211E8112CFE}" type="datetimeFigureOut">
               <a:rPr lang="de-CH" smtClean="0"/>
-              <a:t>05.09.2020</a:t>
+              <a:t>09.09.2020</a:t>
             </a:fld>
             <a:endParaRPr lang="de-CH"/>
           </a:p>
@@ -3962,7 +3962,7 @@
           <a:p>
             <a:fld id="{CBF0EB22-9355-4E16-8B44-2211E8112CFE}" type="datetimeFigureOut">
               <a:rPr lang="de-CH" smtClean="0"/>
-              <a:t>05.09.2020</a:t>
+              <a:t>09.09.2020</a:t>
             </a:fld>
             <a:endParaRPr lang="de-CH"/>
           </a:p>
@@ -5744,13 +5744,13 @@
           <a:p>
             <a:r>
               <a:rPr lang="de-CH" dirty="0"/>
+              <a:t>Für optimales Spielen</a:t>
+            </a:r>
+          </a:p>
+          <a:p>
+            <a:r>
+              <a:rPr lang="de-CH" dirty="0"/>
               <a:t>Oszillatoren abstimmen</a:t>
-            </a:r>
-          </a:p>
-          <a:p>
-            <a:r>
-              <a:rPr lang="de-CH" dirty="0"/>
-              <a:t>Für optimales Spielen</a:t>
             </a:r>
           </a:p>
         </p:txBody>
@@ -5904,6 +5904,12 @@
         <p:txBody>
           <a:bodyPr/>
           <a:lstStyle/>
+          <a:p>
+            <a:r>
+              <a:rPr lang="de-CH" dirty="0"/>
+              <a:t>Genaue Frequenzmessung nötig</a:t>
+            </a:r>
+          </a:p>
           <a:p>
             <a:r>
               <a:rPr lang="de-CH" dirty="0"/>

</xml_diff>

<commit_message>
added factsheet and poster
</commit_message>
<xml_diff>
--- a/Praesi/Digitales Theremin.pptx
+++ b/Praesi/Digitales Theremin.pptx
@@ -15,7 +15,7 @@
     <p:sldId id="259" r:id="rId6"/>
     <p:sldId id="271" r:id="rId7"/>
     <p:sldId id="272" r:id="rId8"/>
-    <p:sldId id="279" r:id="rId9"/>
+    <p:sldId id="282" r:id="rId9"/>
     <p:sldId id="280" r:id="rId10"/>
     <p:sldId id="275" r:id="rId11"/>
     <p:sldId id="276" r:id="rId12"/>
@@ -220,7 +220,7 @@
           <a:p>
             <a:fld id="{4F6A71F5-E6D9-4084-8738-38AAC0210A80}" type="datetimeFigureOut">
               <a:rPr lang="de-CH" smtClean="0"/>
-              <a:t>10.09.2020</a:t>
+              <a:t>11.09.2020</a:t>
             </a:fld>
             <a:endParaRPr lang="de-CH"/>
           </a:p>
@@ -1293,7 +1293,7 @@
           <a:p>
             <a:fld id="{CBF0EB22-9355-4E16-8B44-2211E8112CFE}" type="datetimeFigureOut">
               <a:rPr lang="de-CH" smtClean="0"/>
-              <a:t>10.09.2020</a:t>
+              <a:t>11.09.2020</a:t>
             </a:fld>
             <a:endParaRPr lang="de-CH"/>
           </a:p>
@@ -1493,7 +1493,7 @@
           <a:p>
             <a:fld id="{CBF0EB22-9355-4E16-8B44-2211E8112CFE}" type="datetimeFigureOut">
               <a:rPr lang="de-CH" smtClean="0"/>
-              <a:t>10.09.2020</a:t>
+              <a:t>11.09.2020</a:t>
             </a:fld>
             <a:endParaRPr lang="de-CH"/>
           </a:p>
@@ -1703,7 +1703,7 @@
           <a:p>
             <a:fld id="{CBF0EB22-9355-4E16-8B44-2211E8112CFE}" type="datetimeFigureOut">
               <a:rPr lang="de-CH" smtClean="0"/>
-              <a:t>10.09.2020</a:t>
+              <a:t>11.09.2020</a:t>
             </a:fld>
             <a:endParaRPr lang="de-CH"/>
           </a:p>
@@ -1903,7 +1903,7 @@
           <a:p>
             <a:fld id="{CBF0EB22-9355-4E16-8B44-2211E8112CFE}" type="datetimeFigureOut">
               <a:rPr lang="de-CH" smtClean="0"/>
-              <a:t>10.09.2020</a:t>
+              <a:t>11.09.2020</a:t>
             </a:fld>
             <a:endParaRPr lang="de-CH"/>
           </a:p>
@@ -2179,7 +2179,7 @@
           <a:p>
             <a:fld id="{CBF0EB22-9355-4E16-8B44-2211E8112CFE}" type="datetimeFigureOut">
               <a:rPr lang="de-CH" smtClean="0"/>
-              <a:t>10.09.2020</a:t>
+              <a:t>11.09.2020</a:t>
             </a:fld>
             <a:endParaRPr lang="de-CH"/>
           </a:p>
@@ -2447,7 +2447,7 @@
           <a:p>
             <a:fld id="{CBF0EB22-9355-4E16-8B44-2211E8112CFE}" type="datetimeFigureOut">
               <a:rPr lang="de-CH" smtClean="0"/>
-              <a:t>10.09.2020</a:t>
+              <a:t>11.09.2020</a:t>
             </a:fld>
             <a:endParaRPr lang="de-CH"/>
           </a:p>
@@ -2862,7 +2862,7 @@
           <a:p>
             <a:fld id="{CBF0EB22-9355-4E16-8B44-2211E8112CFE}" type="datetimeFigureOut">
               <a:rPr lang="de-CH" smtClean="0"/>
-              <a:t>10.09.2020</a:t>
+              <a:t>11.09.2020</a:t>
             </a:fld>
             <a:endParaRPr lang="de-CH"/>
           </a:p>
@@ -3004,7 +3004,7 @@
           <a:p>
             <a:fld id="{CBF0EB22-9355-4E16-8B44-2211E8112CFE}" type="datetimeFigureOut">
               <a:rPr lang="de-CH" smtClean="0"/>
-              <a:t>10.09.2020</a:t>
+              <a:t>11.09.2020</a:t>
             </a:fld>
             <a:endParaRPr lang="de-CH"/>
           </a:p>
@@ -3117,7 +3117,7 @@
           <a:p>
             <a:fld id="{CBF0EB22-9355-4E16-8B44-2211E8112CFE}" type="datetimeFigureOut">
               <a:rPr lang="de-CH" smtClean="0"/>
-              <a:t>10.09.2020</a:t>
+              <a:t>11.09.2020</a:t>
             </a:fld>
             <a:endParaRPr lang="de-CH"/>
           </a:p>
@@ -3430,7 +3430,7 @@
           <a:p>
             <a:fld id="{CBF0EB22-9355-4E16-8B44-2211E8112CFE}" type="datetimeFigureOut">
               <a:rPr lang="de-CH" smtClean="0"/>
-              <a:t>10.09.2020</a:t>
+              <a:t>11.09.2020</a:t>
             </a:fld>
             <a:endParaRPr lang="de-CH"/>
           </a:p>
@@ -3719,7 +3719,7 @@
           <a:p>
             <a:fld id="{CBF0EB22-9355-4E16-8B44-2211E8112CFE}" type="datetimeFigureOut">
               <a:rPr lang="de-CH" smtClean="0"/>
-              <a:t>10.09.2020</a:t>
+              <a:t>11.09.2020</a:t>
             </a:fld>
             <a:endParaRPr lang="de-CH"/>
           </a:p>
@@ -3962,7 +3962,7 @@
           <a:p>
             <a:fld id="{CBF0EB22-9355-4E16-8B44-2211E8112CFE}" type="datetimeFigureOut">
               <a:rPr lang="de-CH" smtClean="0"/>
-              <a:t>10.09.2020</a:t>
+              <a:t>11.09.2020</a:t>
             </a:fld>
             <a:endParaRPr lang="de-CH"/>
           </a:p>
@@ -5583,47 +5583,21 @@
           <a:chExt cx="0" cy="0"/>
         </a:xfrm>
       </p:grpSpPr>
-      <p:sp>
-        <p:nvSpPr>
-          <p:cNvPr id="2" name="Titel 1">
-            <a:extLst>
-              <a:ext uri="{FF2B5EF4-FFF2-40B4-BE49-F238E27FC236}">
-                <a16:creationId xmlns:a16="http://schemas.microsoft.com/office/drawing/2014/main" id="{76D9EE95-243A-47E5-A2B7-8BEA3877A768}"/>
-              </a:ext>
-            </a:extLst>
-          </p:cNvPr>
-          <p:cNvSpPr>
-            <a:spLocks noGrp="1"/>
-          </p:cNvSpPr>
-          <p:nvPr>
-            <p:ph type="title"/>
-          </p:nvPr>
-        </p:nvSpPr>
-        <p:spPr/>
-        <p:txBody>
-          <a:bodyPr/>
-          <a:lstStyle/>
-          <a:p>
-            <a:r>
-              <a:rPr lang="de-CH" dirty="0"/>
-              <a:t>Das Theremin nach P6</a:t>
-            </a:r>
-          </a:p>
-        </p:txBody>
-      </p:sp>
       <p:pic>
         <p:nvPicPr>
-          <p:cNvPr id="10" name="Grafik 9">
-            <a:extLst>
-              <a:ext uri="{FF2B5EF4-FFF2-40B4-BE49-F238E27FC236}">
-                <a16:creationId xmlns:a16="http://schemas.microsoft.com/office/drawing/2014/main" id="{9F2CD2E3-042F-4613-A6C0-1B1C99E09657}"/>
+          <p:cNvPr id="12" name="Inhaltsplatzhalter 11" descr="Ein Bild, das Spiel enthält.&#10;&#10;Automatisch generierte Beschreibung">
+            <a:extLst>
+              <a:ext uri="{FF2B5EF4-FFF2-40B4-BE49-F238E27FC236}">
+                <a16:creationId xmlns:a16="http://schemas.microsoft.com/office/drawing/2014/main" id="{98BE2A30-98FB-4105-8FEE-E24D8592DC0A}"/>
               </a:ext>
             </a:extLst>
           </p:cNvPr>
           <p:cNvPicPr>
-            <a:picLocks noChangeAspect="1"/>
+            <a:picLocks noGrp="1" noChangeAspect="1"/>
           </p:cNvPicPr>
-          <p:nvPr/>
+          <p:nvPr>
+            <p:ph idx="1"/>
+          </p:nvPr>
         </p:nvPicPr>
         <p:blipFill>
           <a:blip r:embed="rId3">
@@ -5639,73 +5613,36 @@
         </p:blipFill>
         <p:spPr>
           <a:xfrm>
-            <a:off x="838200" y="982153"/>
-            <a:ext cx="10173849" cy="14388174"/>
+            <a:off x="442788" y="-1811620"/>
+            <a:ext cx="10420681" cy="14737253"/>
           </a:xfrm>
-          <a:prstGeom prst="rect">
-            <a:avLst/>
-          </a:prstGeom>
         </p:spPr>
       </p:pic>
       <p:sp>
         <p:nvSpPr>
-          <p:cNvPr id="4" name="Inhaltsplatzhalter 2">
-            <a:extLst>
-              <a:ext uri="{FF2B5EF4-FFF2-40B4-BE49-F238E27FC236}">
-                <a16:creationId xmlns:a16="http://schemas.microsoft.com/office/drawing/2014/main" id="{7D4E7A7F-41FF-4358-9DCF-5144897C2046}"/>
-              </a:ext>
-            </a:extLst>
-          </p:cNvPr>
-          <p:cNvSpPr>
-            <a:spLocks noGrp="1"/>
-          </p:cNvSpPr>
-          <p:nvPr>
-            <p:ph idx="1"/>
-          </p:nvPr>
-        </p:nvSpPr>
-        <p:spPr>
-          <a:xfrm>
-            <a:off x="838200" y="1885680"/>
-            <a:ext cx="10515600" cy="1716228"/>
-          </a:xfrm>
-        </p:spPr>
-        <p:txBody>
-          <a:bodyPr numCol="2">
-            <a:normAutofit fontScale="92500" lnSpcReduction="20000"/>
-          </a:bodyPr>
+          <p:cNvPr id="2" name="Titel 1">
+            <a:extLst>
+              <a:ext uri="{FF2B5EF4-FFF2-40B4-BE49-F238E27FC236}">
+                <a16:creationId xmlns:a16="http://schemas.microsoft.com/office/drawing/2014/main" id="{76D9EE95-243A-47E5-A2B7-8BEA3877A768}"/>
+              </a:ext>
+            </a:extLst>
+          </p:cNvPr>
+          <p:cNvSpPr>
+            <a:spLocks noGrp="1"/>
+          </p:cNvSpPr>
+          <p:nvPr>
+            <p:ph type="title"/>
+          </p:nvPr>
+        </p:nvSpPr>
+        <p:spPr/>
+        <p:txBody>
+          <a:bodyPr/>
           <a:lstStyle/>
           <a:p>
             <a:r>
               <a:rPr lang="de-CH" dirty="0"/>
-              <a:t>Digital  				</a:t>
-            </a:r>
-          </a:p>
-          <a:p>
-            <a:r>
-              <a:rPr lang="de-CH" dirty="0"/>
-              <a:t>Bedienung über Display</a:t>
-            </a:r>
-          </a:p>
-          <a:p>
-            <a:endParaRPr lang="de-CH" dirty="0"/>
-          </a:p>
-          <a:p>
-            <a:endParaRPr lang="de-CH" dirty="0"/>
-          </a:p>
-          <a:p>
-            <a:r>
-              <a:rPr lang="de-CH" dirty="0"/>
-              <a:t>Gehäuse</a:t>
-            </a:r>
-          </a:p>
-          <a:p>
-            <a:r>
-              <a:rPr lang="de-CH" dirty="0"/>
-              <a:t>Zusatzfunktionen</a:t>
-            </a:r>
-          </a:p>
-          <a:p>
-            <a:endParaRPr lang="de-CH" dirty="0"/>
+              <a:t>Das Theremin nach P6</a:t>
+            </a:r>
           </a:p>
         </p:txBody>
       </p:sp>
@@ -6425,41 +6362,6 @@
           </a:p>
         </p:txBody>
       </p:sp>
-      <p:pic>
-        <p:nvPicPr>
-          <p:cNvPr id="5" name="Inhaltsplatzhalter 4" descr="Ein Bild, das Uhr enthält.&#10;&#10;Automatisch generierte Beschreibung">
-            <a:extLst>
-              <a:ext uri="{FF2B5EF4-FFF2-40B4-BE49-F238E27FC236}">
-                <a16:creationId xmlns:a16="http://schemas.microsoft.com/office/drawing/2014/main" id="{08281019-F05E-4CB0-AD92-0ED0725819FF}"/>
-              </a:ext>
-            </a:extLst>
-          </p:cNvPr>
-          <p:cNvPicPr>
-            <a:picLocks noGrp="1" noChangeAspect="1"/>
-          </p:cNvPicPr>
-          <p:nvPr>
-            <p:ph idx="1"/>
-          </p:nvPr>
-        </p:nvPicPr>
-        <p:blipFill>
-          <a:blip r:embed="rId2">
-            <a:extLst>
-              <a:ext uri="{28A0092B-C50C-407E-A947-70E740481C1C}">
-                <a14:useLocalDpi xmlns:a14="http://schemas.microsoft.com/office/drawing/2010/main" val="0"/>
-              </a:ext>
-            </a:extLst>
-          </a:blip>
-          <a:stretch>
-            <a:fillRect/>
-          </a:stretch>
-        </p:blipFill>
-        <p:spPr>
-          <a:xfrm>
-            <a:off x="6954479" y="1825625"/>
-            <a:ext cx="3051816" cy="2290577"/>
-          </a:xfrm>
-        </p:spPr>
-      </p:pic>
       <p:sp>
         <p:nvSpPr>
           <p:cNvPr id="6" name="Inhaltsplatzhalter 2">
@@ -6671,10 +6573,82 @@
           </a:p>
         </p:txBody>
       </p:sp>
+      <p:pic>
+        <p:nvPicPr>
+          <p:cNvPr id="8" name="Inhaltsplatzhalter 4" descr="Ein Bild, das Uhr enthält.&#10;&#10;Automatisch generierte Beschreibung">
+            <a:extLst>
+              <a:ext uri="{FF2B5EF4-FFF2-40B4-BE49-F238E27FC236}">
+                <a16:creationId xmlns:a16="http://schemas.microsoft.com/office/drawing/2014/main" id="{30D5ED2D-CB13-4504-BC32-2ED7D44CA5A4}"/>
+              </a:ext>
+            </a:extLst>
+          </p:cNvPr>
+          <p:cNvPicPr>
+            <a:picLocks noChangeAspect="1"/>
+          </p:cNvPicPr>
+          <p:nvPr/>
+        </p:nvPicPr>
+        <p:blipFill>
+          <a:blip r:embed="rId2">
+            <a:extLst>
+              <a:ext uri="{28A0092B-C50C-407E-A947-70E740481C1C}">
+                <a14:useLocalDpi xmlns:a14="http://schemas.microsoft.com/office/drawing/2010/main" val="0"/>
+              </a:ext>
+            </a:extLst>
+          </a:blip>
+          <a:stretch>
+            <a:fillRect/>
+          </a:stretch>
+        </p:blipFill>
+        <p:spPr>
+          <a:xfrm>
+            <a:off x="8301984" y="800370"/>
+            <a:ext cx="3051816" cy="2290577"/>
+          </a:xfrm>
+          <a:prstGeom prst="rect">
+            <a:avLst/>
+          </a:prstGeom>
+        </p:spPr>
+      </p:pic>
+      <p:pic>
+        <p:nvPicPr>
+          <p:cNvPr id="9" name="Grafik 8" descr="Ein Bild, das Zeichnung enthält.&#10;&#10;Automatisch generierte Beschreibung">
+            <a:extLst>
+              <a:ext uri="{FF2B5EF4-FFF2-40B4-BE49-F238E27FC236}">
+                <a16:creationId xmlns:a16="http://schemas.microsoft.com/office/drawing/2014/main" id="{3932B71F-9F44-48E6-BA55-4FDD80137A5C}"/>
+              </a:ext>
+            </a:extLst>
+          </p:cNvPr>
+          <p:cNvPicPr>
+            <a:picLocks noChangeAspect="1"/>
+          </p:cNvPicPr>
+          <p:nvPr/>
+        </p:nvPicPr>
+        <p:blipFill>
+          <a:blip r:embed="rId3">
+            <a:extLst>
+              <a:ext uri="{28A0092B-C50C-407E-A947-70E740481C1C}">
+                <a14:useLocalDpi xmlns:a14="http://schemas.microsoft.com/office/drawing/2010/main" val="0"/>
+              </a:ext>
+            </a:extLst>
+          </a:blip>
+          <a:stretch>
+            <a:fillRect/>
+          </a:stretch>
+        </p:blipFill>
+        <p:spPr>
+          <a:xfrm>
+            <a:off x="8301984" y="3685129"/>
+            <a:ext cx="3051816" cy="2290577"/>
+          </a:xfrm>
+          <a:prstGeom prst="rect">
+            <a:avLst/>
+          </a:prstGeom>
+        </p:spPr>
+      </p:pic>
     </p:spTree>
     <p:extLst>
       <p:ext uri="{BB962C8B-B14F-4D97-AF65-F5344CB8AC3E}">
-        <p14:creationId xmlns:p14="http://schemas.microsoft.com/office/powerpoint/2010/main" val="500444863"/>
+        <p14:creationId xmlns:p14="http://schemas.microsoft.com/office/powerpoint/2010/main" val="2613777296"/>
       </p:ext>
     </p:extLst>
   </p:cSld>

</xml_diff>